<commit_message>
Lecture 3 typos on s22-24 fixed
</commit_message>
<xml_diff>
--- a/content/lectures/lecture03/slides/Lecture03_Data_II.pptx
+++ b/content/lectures/lecture03/slides/Lecture03_Data_II.pptx
@@ -13977,7 +13977,7 @@
                 </a:solidFill>
                 <a:latin typeface="Courier" pitchFamily="2" charset="0"/>
               </a:rPr>
-              <a:t>text</a:t>
+              <a:t>content</a:t>
             </a:r>
             <a:endParaRPr lang="en-US" sz="2400" dirty="0">
               <a:solidFill>
@@ -16151,7 +16151,7 @@
               <a:t>(</a:t>
             </a:r>
             <a:r>
-              <a:rPr lang="en-US" sz="2400" dirty="0">
+              <a:rPr lang="en-US" sz="2400" dirty="0" err="1">
                 <a:solidFill>
                   <a:schemeClr val="accent6">
                     <a:lumMod val="50000"/>
@@ -16159,7 +16159,16 @@
                 </a:solidFill>
                 <a:latin typeface="Courier" pitchFamily="2" charset="0"/>
               </a:rPr>
-              <a:t>page</a:t>
+              <a:t>page.</a:t>
+            </a:r>
+            <a:r>
+              <a:rPr lang="en-US" sz="2400" dirty="0" err="1">
+                <a:solidFill>
+                  <a:srgbClr val="C00000"/>
+                </a:solidFill>
+                <a:latin typeface="Courier" pitchFamily="2" charset="0"/>
+              </a:rPr>
+              <a:t>content</a:t>
             </a:r>
             <a:r>
               <a:rPr lang="en-US" sz="2400" dirty="0">
@@ -16261,7 +16270,7 @@
                 </a:solidFill>
                 <a:latin typeface="Courier" pitchFamily="2" charset="0"/>
               </a:rPr>
-              <a:t>page</a:t>
+              <a:t>soup</a:t>
             </a:r>
             <a:r>
               <a:rPr lang="en-US" sz="2400" dirty="0" err="1">
@@ -16834,7 +16843,7 @@
               <a:t>(</a:t>
             </a:r>
             <a:r>
-              <a:rPr lang="en-US" sz="2400" dirty="0">
+              <a:rPr lang="en-US" sz="2400" dirty="0" err="1">
                 <a:solidFill>
                   <a:schemeClr val="accent6">
                     <a:lumMod val="50000"/>
@@ -16842,7 +16851,16 @@
                 </a:solidFill>
                 <a:latin typeface="Courier" pitchFamily="2" charset="0"/>
               </a:rPr>
-              <a:t>page</a:t>
+              <a:t>page.</a:t>
+            </a:r>
+            <a:r>
+              <a:rPr lang="en-US" sz="2400" dirty="0" err="1">
+                <a:solidFill>
+                  <a:srgbClr val="C00000"/>
+                </a:solidFill>
+                <a:latin typeface="Courier" pitchFamily="2" charset="0"/>
+              </a:rPr>
+              <a:t>content</a:t>
             </a:r>
             <a:r>
               <a:rPr lang="en-US" sz="2400" dirty="0">
@@ -16944,7 +16962,7 @@
                 </a:solidFill>
                 <a:latin typeface="Courier" pitchFamily="2" charset="0"/>
               </a:rPr>
-              <a:t>page</a:t>
+              <a:t>soup</a:t>
             </a:r>
             <a:r>
               <a:rPr lang="en-US" sz="2400" dirty="0" err="1">
@@ -17389,7 +17407,7 @@
               <a:t>(</a:t>
             </a:r>
             <a:r>
-              <a:rPr lang="en-US" sz="2400" dirty="0">
+              <a:rPr lang="en-US" sz="2400" dirty="0" err="1">
                 <a:solidFill>
                   <a:schemeClr val="accent6">
                     <a:lumMod val="50000"/>
@@ -17397,7 +17415,16 @@
                 </a:solidFill>
                 <a:latin typeface="Courier" pitchFamily="2" charset="0"/>
               </a:rPr>
-              <a:t>page</a:t>
+              <a:t>page.</a:t>
+            </a:r>
+            <a:r>
+              <a:rPr lang="en-US" sz="2400" dirty="0" err="1">
+                <a:solidFill>
+                  <a:srgbClr val="C00000"/>
+                </a:solidFill>
+                <a:latin typeface="Courier" pitchFamily="2" charset="0"/>
+              </a:rPr>
+              <a:t>content</a:t>
             </a:r>
             <a:r>
               <a:rPr lang="en-US" sz="2400" dirty="0">
@@ -17499,7 +17526,7 @@
                 </a:solidFill>
                 <a:latin typeface="Courier" pitchFamily="2" charset="0"/>
               </a:rPr>
-              <a:t>page</a:t>
+              <a:t>soup</a:t>
             </a:r>
             <a:r>
               <a:rPr lang="en-US" sz="2400" dirty="0" err="1">
@@ -22104,7 +22131,7 @@
                 </a:solidFill>
                 <a:latin typeface="Courier" pitchFamily="2" charset="0"/>
               </a:rPr>
-              <a:t>b</a:t>
+              <a:t>c</a:t>
             </a:r>
             <a:r>
               <a:rPr lang="en-US" sz="2000" dirty="0">

</xml_diff>